<commit_message>
Recreated some lost slides and kleaned up some code
</commit_message>
<xml_diff>
--- a/slides/Intro.pptx
+++ b/slides/Intro.pptx
@@ -3746,13 +3746,13 @@
   <p:clrMapOvr>
     <a:masterClrMapping/>
   </p:clrMapOvr>
-  <mc:AlternateContent xmlns:mc="http://schemas.openxmlformats.org/markup-compatibility/2006">
-    <mc:Choice xmlns:p159="http://schemas.microsoft.com/office/powerpoint/2015/09/main" Requires="p159">
+  <mc:AlternateContent xmlns:mc="http://schemas.openxmlformats.org/markup-compatibility/2006" xmlns:p159="http://schemas.microsoft.com/office/powerpoint/2015/09/main">
+    <mc:Choice Requires="p159">
       <p:transition xmlns:p14="http://schemas.microsoft.com/office/powerpoint/2010/main" spd="slow" p14:dur="2000">
         <p159:morph option="byObject"/>
       </p:transition>
     </mc:Choice>
-    <mc:Fallback>
+    <mc:Fallback xmlns="">
       <p:transition spd="slow">
         <p:fade/>
       </p:transition>
@@ -4087,10 +4087,6 @@
               </a:rPr>
               <a:t>Mennesker lærer fra erfaring, men maskiner må programmeres</a:t>
             </a:r>
-            <a:endParaRPr lang="nb-NO" sz="3600" b="1" dirty="0">
-              <a:latin typeface="Calibri" panose="020F0502020204030204" pitchFamily="34" charset="0"/>
-              <a:cs typeface="Calibri" panose="020F0502020204030204" pitchFamily="34" charset="0"/>
-            </a:endParaRPr>
           </a:p>
         </p:txBody>
       </p:sp>
@@ -4213,10 +4209,6 @@
               </a:rPr>
               <a:t>Maskinlæring går ut på å la maskiner lære fra tidligere eksempler</a:t>
             </a:r>
-            <a:endParaRPr lang="nb-NO" sz="3600" b="1" dirty="0">
-              <a:latin typeface="Calibri" panose="020F0502020204030204" pitchFamily="34" charset="0"/>
-              <a:cs typeface="Calibri" panose="020F0502020204030204" pitchFamily="34" charset="0"/>
-            </a:endParaRPr>
           </a:p>
         </p:txBody>
       </p:sp>
@@ -6180,13 +6172,13 @@
   <p:clrMapOvr>
     <a:masterClrMapping/>
   </p:clrMapOvr>
-  <mc:AlternateContent xmlns:mc="http://schemas.openxmlformats.org/markup-compatibility/2006">
-    <mc:Choice xmlns:p159="http://schemas.microsoft.com/office/powerpoint/2015/09/main" Requires="p159">
+  <mc:AlternateContent xmlns:mc="http://schemas.openxmlformats.org/markup-compatibility/2006" xmlns:p159="http://schemas.microsoft.com/office/powerpoint/2015/09/main">
+    <mc:Choice Requires="p159">
       <p:transition xmlns:p14="http://schemas.microsoft.com/office/powerpoint/2010/main" spd="slow" p14:dur="2000">
         <p159:morph option="byObject"/>
       </p:transition>
     </mc:Choice>
-    <mc:Fallback>
+    <mc:Fallback xmlns="">
       <p:transition spd="slow">
         <p:fade/>
       </p:transition>

</xml_diff>